<commit_message>
er diagram in ppt
</commit_message>
<xml_diff>
--- a/presentation/Batch 5_Team 5.pptx
+++ b/presentation/Batch 5_Team 5.pptx
@@ -130,6 +130,11 @@
       </a:defRPr>
     </a:lvl9pPr>
   </p:defaultTextStyle>
+  <p:extLst>
+    <p:ext uri="{EFAFB233-063F-42B5-8137-9DF3F51BA10A}">
+      <p15:sldGuideLst xmlns:p15="http://schemas.microsoft.com/office/powerpoint/2012/main"/>
+    </p:ext>
+  </p:extLst>
 </p:presentation>
 </file>
 
@@ -296,7 +301,7 @@
           <a:p>
             <a:fld id="{1160EA64-D806-43AC-9DF2-F8C432F32B4C}" type="datetimeFigureOut">
               <a:rPr lang="en-US" dirty="0"/>
-              <a:t>8/26/2023</a:t>
+              <a:t>8/28/2023</a:t>
             </a:fld>
             <a:endParaRPr lang="en-US" dirty="0"/>
           </a:p>
@@ -462,7 +467,7 @@
           <a:p>
             <a:fld id="{E9F9C37B-1D36-470B-8223-D6C91242EC14}" type="datetimeFigureOut">
               <a:rPr lang="en-US" dirty="0"/>
-              <a:t>8/26/2023</a:t>
+              <a:t>8/28/2023</a:t>
             </a:fld>
             <a:endParaRPr lang="en-US" dirty="0"/>
           </a:p>
@@ -637,7 +642,7 @@
           <a:p>
             <a:fld id="{67C6F52A-A82B-47A2-A83A-8C4C91F2D59F}" type="datetimeFigureOut">
               <a:rPr lang="en-US" dirty="0"/>
-              <a:t>8/26/2023</a:t>
+              <a:t>8/28/2023</a:t>
             </a:fld>
             <a:endParaRPr lang="en-US" dirty="0"/>
           </a:p>
@@ -802,7 +807,7 @@
           <a:p>
             <a:fld id="{F070A7B3-6521-4DCA-87E5-044747A908C1}" type="datetimeFigureOut">
               <a:rPr lang="en-US" dirty="0"/>
-              <a:t>8/26/2023</a:t>
+              <a:t>8/28/2023</a:t>
             </a:fld>
             <a:endParaRPr lang="en-US" dirty="0"/>
           </a:p>
@@ -1066,7 +1071,7 @@
           <a:p>
             <a:fld id="{1160EA64-D806-43AC-9DF2-F8C432F32B4C}" type="datetimeFigureOut">
               <a:rPr lang="en-US" dirty="0"/>
-              <a:t>8/26/2023</a:t>
+              <a:t>8/28/2023</a:t>
             </a:fld>
             <a:endParaRPr lang="en-US" dirty="0"/>
           </a:p>
@@ -1294,7 +1299,7 @@
           <a:p>
             <a:fld id="{AB134690-1557-4C89-A502-4959FE7FAD70}" type="datetimeFigureOut">
               <a:rPr lang="en-US" dirty="0"/>
-              <a:t>8/26/2023</a:t>
+              <a:t>8/28/2023</a:t>
             </a:fld>
             <a:endParaRPr lang="en-US" dirty="0"/>
           </a:p>
@@ -1648,7 +1653,7 @@
           <a:p>
             <a:fld id="{4F7D4976-E339-4826-83B7-FBD03F55ECF8}" type="datetimeFigureOut">
               <a:rPr lang="en-US" dirty="0"/>
-              <a:t>8/26/2023</a:t>
+              <a:t>8/28/2023</a:t>
             </a:fld>
             <a:endParaRPr lang="en-US" dirty="0"/>
           </a:p>
@@ -1784,7 +1789,7 @@
           <a:p>
             <a:fld id="{E1037C31-9E7A-4F99-8774-A0E530DE1A42}" type="datetimeFigureOut">
               <a:rPr lang="en-US" dirty="0"/>
-              <a:t>8/26/2023</a:t>
+              <a:t>8/28/2023</a:t>
             </a:fld>
             <a:endParaRPr lang="en-US" dirty="0"/>
           </a:p>
@@ -1874,7 +1879,7 @@
           <a:p>
             <a:fld id="{C278504F-A551-4DE0-9316-4DCD1D8CC752}" type="datetimeFigureOut">
               <a:rPr lang="en-US" dirty="0"/>
-              <a:t>8/26/2023</a:t>
+              <a:t>8/28/2023</a:t>
             </a:fld>
             <a:endParaRPr lang="en-US" dirty="0"/>
           </a:p>
@@ -2226,7 +2231,7 @@
           <a:p>
             <a:fld id="{D1BE4249-C0D0-4B06-8692-E8BB871AF643}" type="datetimeFigureOut">
               <a:rPr lang="en-US" dirty="0"/>
-              <a:t>8/26/2023</a:t>
+              <a:t>8/28/2023</a:t>
             </a:fld>
             <a:endParaRPr lang="en-US" dirty="0"/>
           </a:p>
@@ -2578,7 +2583,7 @@
           <a:p>
             <a:fld id="{042B0DB6-F5C7-45FB-8CF3-31B45F9C2DAC}" type="datetimeFigureOut">
               <a:rPr lang="en-US" dirty="0"/>
-              <a:t>8/26/2023</a:t>
+              <a:t>8/28/2023</a:t>
             </a:fld>
             <a:endParaRPr lang="en-US" dirty="0"/>
           </a:p>
@@ -2815,7 +2820,7 @@
           <a:p>
             <a:fld id="{1160EA64-D806-43AC-9DF2-F8C432F32B4C}" type="datetimeFigureOut">
               <a:rPr lang="en-US" dirty="0"/>
-              <a:t>8/26/2023</a:t>
+              <a:t>8/28/2023</a:t>
             </a:fld>
             <a:endParaRPr lang="en-US" dirty="0"/>
           </a:p>
@@ -4985,6 +4990,71 @@
           <a:chExt cx="0" cy="0"/>
         </a:xfrm>
       </p:grpSpPr>
+      <p:pic>
+        <p:nvPicPr>
+          <p:cNvPr id="3" name="Picture 2">
+            <a:extLst>
+              <a:ext uri="{FF2B5EF4-FFF2-40B4-BE49-F238E27FC236}">
+                <a16:creationId xmlns:a16="http://schemas.microsoft.com/office/drawing/2014/main" id="{E180C7F1-4063-D0B0-0B27-D8F1C13C8A0D}"/>
+              </a:ext>
+            </a:extLst>
+          </p:cNvPr>
+          <p:cNvPicPr>
+            <a:picLocks noChangeAspect="1"/>
+          </p:cNvPicPr>
+          <p:nvPr/>
+        </p:nvPicPr>
+        <p:blipFill>
+          <a:blip r:embed="rId2"/>
+          <a:stretch>
+            <a:fillRect/>
+          </a:stretch>
+        </p:blipFill>
+        <p:spPr>
+          <a:xfrm>
+            <a:off x="1840517" y="1053255"/>
+            <a:ext cx="8510966" cy="5804745"/>
+          </a:xfrm>
+          <a:prstGeom prst="rect">
+            <a:avLst/>
+          </a:prstGeom>
+        </p:spPr>
+      </p:pic>
+      <p:sp>
+        <p:nvSpPr>
+          <p:cNvPr id="4" name="TextBox 3">
+            <a:extLst>
+              <a:ext uri="{FF2B5EF4-FFF2-40B4-BE49-F238E27FC236}">
+                <a16:creationId xmlns:a16="http://schemas.microsoft.com/office/drawing/2014/main" id="{AC39D5BD-E3C7-ACC0-E47C-0CD1CE2683D5}"/>
+              </a:ext>
+            </a:extLst>
+          </p:cNvPr>
+          <p:cNvSpPr txBox="1"/>
+          <p:nvPr/>
+        </p:nvSpPr>
+        <p:spPr>
+          <a:xfrm>
+            <a:off x="1840517" y="395564"/>
+            <a:ext cx="5128591" cy="523220"/>
+          </a:xfrm>
+          <a:prstGeom prst="rect">
+            <a:avLst/>
+          </a:prstGeom>
+          <a:noFill/>
+        </p:spPr>
+        <p:txBody>
+          <a:bodyPr wrap="square" rtlCol="0">
+            <a:spAutoFit/>
+          </a:bodyPr>
+          <a:lstStyle/>
+          <a:p>
+            <a:r>
+              <a:rPr lang="en-IN" sz="2800" dirty="0"/>
+              <a:t>ER Diagram</a:t>
+            </a:r>
+          </a:p>
+        </p:txBody>
+      </p:sp>
     </p:spTree>
     <p:extLst>
       <p:ext uri="{BB962C8B-B14F-4D97-AF65-F5344CB8AC3E}">

</xml_diff>